<commit_message>
push Sat PM work
</commit_message>
<xml_diff>
--- a/Day_1/Day_1_Lectures/Slides/Day_1_Lecture_Arch.pptx
+++ b/Day_1/Day_1_Lectures/Slides/Day_1_Lecture_Arch.pptx
@@ -211,7 +211,7 @@
           <a:p>
             <a:fld id="{9A0E6E77-3283-344D-9AC2-FD5DD182305F}" type="datetimeFigureOut">
               <a:rPr lang="en-US" smtClean="0"/>
-              <a:t>1/19/15</a:t>
+              <a:t>2/14/15</a:t>
             </a:fld>
             <a:endParaRPr lang="en-US"/>
           </a:p>
@@ -789,11 +789,7 @@
             </a:r>
             <a:r>
               <a:rPr lang="en-US" baseline="0" dirty="0" smtClean="0"/>
-              <a:t> different contexts of planning, use, and reuse</a:t>
-            </a:r>
-            <a:r>
-              <a:rPr lang="en-US" baseline="0" dirty="0" smtClean="0"/>
-              <a:t>.</a:t>
+              <a:t> different contexts of planning, use, and reuse.</a:t>
             </a:r>
           </a:p>
           <a:p>
@@ -986,15 +982,7 @@
           <a:p>
             <a:r>
               <a:rPr lang="en-US" baseline="0" dirty="0" smtClean="0"/>
-              <a:t>This </a:t>
-            </a:r>
-            <a:r>
-              <a:rPr lang="en-US" baseline="0" dirty="0" smtClean="0"/>
-              <a:t>idea is – similarly – important to data curation in that we want to focus on a scholarly </a:t>
-            </a:r>
-            <a:r>
-              <a:rPr lang="en-US" baseline="0" dirty="0" smtClean="0"/>
-              <a:t>record… again, this relies on our definition of data being a role played by an information object, and that role is evidence. </a:t>
+              <a:t>This idea is – similarly – important to data curation in that we want to focus on a scholarly record… again, this relies on our definition of data being a role played by an information object, and that role is evidence. </a:t>
             </a:r>
           </a:p>
           <a:p>
@@ -1813,7 +1801,7 @@
           <a:p>
             <a:fld id="{9D6228D5-5F93-BB4A-964B-203967C46295}" type="datetimeFigureOut">
               <a:rPr lang="en-US" smtClean="0"/>
-              <a:t>1/19/15</a:t>
+              <a:t>2/14/15</a:t>
             </a:fld>
             <a:endParaRPr lang="en-US"/>
           </a:p>
@@ -1983,7 +1971,7 @@
           <a:p>
             <a:fld id="{9D6228D5-5F93-BB4A-964B-203967C46295}" type="datetimeFigureOut">
               <a:rPr lang="en-US" smtClean="0"/>
-              <a:t>1/19/15</a:t>
+              <a:t>2/14/15</a:t>
             </a:fld>
             <a:endParaRPr lang="en-US"/>
           </a:p>
@@ -2163,7 +2151,7 @@
           <a:p>
             <a:fld id="{9D6228D5-5F93-BB4A-964B-203967C46295}" type="datetimeFigureOut">
               <a:rPr lang="en-US" smtClean="0"/>
-              <a:t>1/19/15</a:t>
+              <a:t>2/14/15</a:t>
             </a:fld>
             <a:endParaRPr lang="en-US"/>
           </a:p>
@@ -2333,7 +2321,7 @@
           <a:p>
             <a:fld id="{9D6228D5-5F93-BB4A-964B-203967C46295}" type="datetimeFigureOut">
               <a:rPr lang="en-US" smtClean="0"/>
-              <a:t>1/19/15</a:t>
+              <a:t>2/14/15</a:t>
             </a:fld>
             <a:endParaRPr lang="en-US"/>
           </a:p>
@@ -2579,7 +2567,7 @@
           <a:p>
             <a:fld id="{9D6228D5-5F93-BB4A-964B-203967C46295}" type="datetimeFigureOut">
               <a:rPr lang="en-US" smtClean="0"/>
-              <a:t>1/19/15</a:t>
+              <a:t>2/14/15</a:t>
             </a:fld>
             <a:endParaRPr lang="en-US"/>
           </a:p>
@@ -2867,7 +2855,7 @@
           <a:p>
             <a:fld id="{9D6228D5-5F93-BB4A-964B-203967C46295}" type="datetimeFigureOut">
               <a:rPr lang="en-US" smtClean="0"/>
-              <a:t>1/19/15</a:t>
+              <a:t>2/14/15</a:t>
             </a:fld>
             <a:endParaRPr lang="en-US"/>
           </a:p>
@@ -3289,7 +3277,7 @@
           <a:p>
             <a:fld id="{9D6228D5-5F93-BB4A-964B-203967C46295}" type="datetimeFigureOut">
               <a:rPr lang="en-US" smtClean="0"/>
-              <a:t>1/19/15</a:t>
+              <a:t>2/14/15</a:t>
             </a:fld>
             <a:endParaRPr lang="en-US"/>
           </a:p>
@@ -3407,7 +3395,7 @@
           <a:p>
             <a:fld id="{9D6228D5-5F93-BB4A-964B-203967C46295}" type="datetimeFigureOut">
               <a:rPr lang="en-US" smtClean="0"/>
-              <a:t>1/19/15</a:t>
+              <a:t>2/14/15</a:t>
             </a:fld>
             <a:endParaRPr lang="en-US"/>
           </a:p>
@@ -3502,7 +3490,7 @@
           <a:p>
             <a:fld id="{9D6228D5-5F93-BB4A-964B-203967C46295}" type="datetimeFigureOut">
               <a:rPr lang="en-US" smtClean="0"/>
-              <a:t>1/19/15</a:t>
+              <a:t>2/14/15</a:t>
             </a:fld>
             <a:endParaRPr lang="en-US"/>
           </a:p>
@@ -3779,7 +3767,7 @@
           <a:p>
             <a:fld id="{9D6228D5-5F93-BB4A-964B-203967C46295}" type="datetimeFigureOut">
               <a:rPr lang="en-US" smtClean="0"/>
-              <a:t>1/19/15</a:t>
+              <a:t>2/14/15</a:t>
             </a:fld>
             <a:endParaRPr lang="en-US"/>
           </a:p>
@@ -4032,7 +4020,7 @@
           <a:p>
             <a:fld id="{9D6228D5-5F93-BB4A-964B-203967C46295}" type="datetimeFigureOut">
               <a:rPr lang="en-US" smtClean="0"/>
-              <a:t>1/19/15</a:t>
+              <a:t>2/14/15</a:t>
             </a:fld>
             <a:endParaRPr lang="en-US"/>
           </a:p>
@@ -4245,7 +4233,7 @@
           <a:p>
             <a:fld id="{9D6228D5-5F93-BB4A-964B-203967C46295}" type="datetimeFigureOut">
               <a:rPr lang="en-US" smtClean="0"/>
-              <a:t>1/19/15</a:t>
+              <a:t>2/14/15</a:t>
             </a:fld>
             <a:endParaRPr lang="en-US"/>
           </a:p>
@@ -5751,7 +5739,7 @@
         </p:blipFill>
         <p:spPr>
           <a:xfrm>
-            <a:off x="0" y="189154"/>
+            <a:off x="-72571" y="566241"/>
             <a:ext cx="9144000" cy="5550851"/>
           </a:xfrm>
           <a:prstGeom prst="rect">
@@ -6871,15 +6859,7 @@
             </a:pPr>
             <a:r>
               <a:rPr lang="en-US" dirty="0" smtClean="0"/>
-              <a:t>Important first step in </a:t>
-            </a:r>
-            <a:r>
-              <a:rPr lang="en-US" dirty="0" smtClean="0"/>
-              <a:t>a data </a:t>
-            </a:r>
-            <a:r>
-              <a:rPr lang="en-US" dirty="0" smtClean="0"/>
-              <a:t>curation process: </a:t>
+              <a:t>Important first step in a data curation process: </a:t>
             </a:r>
           </a:p>
           <a:p>

</xml_diff>